<commit_message>
Visual adjustments, add Union slide deck
</commit_message>
<xml_diff>
--- a/ESS_March_2022_IDS_Scipp_McStas_intro/Day2_Thursday_March_17th/07_Samples/More_samples.pptx
+++ b/ESS_March_2022_IDS_Scipp_McStas_intro/Day2_Thursday_March_17th/07_Samples/More_samples.pptx
@@ -355,7 +355,7 @@
       </p:grpSpPr>
       <p:sp>
         <p:nvSpPr>
-          <p:cNvPr id="90" name="Shape 90"/>
+          <p:cNvPr id="155" name="Shape 155"/>
           <p:cNvSpPr/>
           <p:nvPr>
             <p:ph type="sldImg"/>
@@ -380,7 +380,7 @@
       </p:sp>
       <p:sp>
         <p:nvSpPr>
-          <p:cNvPr id="91" name="Shape 91"/>
+          <p:cNvPr id="156" name="Shape 156"/>
           <p:cNvSpPr/>
           <p:nvPr>
             <p:ph type="body" sz="quarter" idx="1"/>
@@ -536,7 +536,7 @@
       </p:grpSpPr>
       <p:sp>
         <p:nvSpPr>
-          <p:cNvPr id="11" name="Logo color"/>
+          <p:cNvPr id="16" name="Logo color"/>
           <p:cNvSpPr/>
           <p:nvPr/>
         </p:nvSpPr>
@@ -1019,7 +1019,7 @@
       </p:sp>
       <p:sp>
         <p:nvSpPr>
-          <p:cNvPr id="12" name="Bottom bar"/>
+          <p:cNvPr id="17" name="Bottom bar"/>
           <p:cNvSpPr/>
           <p:nvPr/>
         </p:nvSpPr>
@@ -1057,7 +1057,7 @@
       </p:sp>
       <p:sp>
         <p:nvSpPr>
-          <p:cNvPr id="13" name="UserProfile.Offices.Workarea_{{DocumentLanguage}}text"/>
+          <p:cNvPr id="18" name="UserProfile.Offices.Workarea_{{DocumentLanguage}}text"/>
           <p:cNvSpPr txBox="1"/>
           <p:nvPr/>
         </p:nvSpPr>
@@ -1104,7 +1104,7 @@
       </p:sp>
       <p:sp>
         <p:nvSpPr>
-          <p:cNvPr id="14" name="Top bar"/>
+          <p:cNvPr id="19" name="Top bar"/>
           <p:cNvSpPr/>
           <p:nvPr/>
         </p:nvSpPr>
@@ -1142,7 +1142,7 @@
       </p:sp>
       <p:sp>
         <p:nvSpPr>
-          <p:cNvPr id="15" name="Logo white"/>
+          <p:cNvPr id="20" name="Logo white"/>
           <p:cNvSpPr/>
           <p:nvPr/>
         </p:nvSpPr>
@@ -1625,7 +1625,7 @@
       </p:sp>
       <p:sp>
         <p:nvSpPr>
-          <p:cNvPr id="16" name="Title Text"/>
+          <p:cNvPr id="21" name="Title Text"/>
           <p:cNvSpPr txBox="1"/>
           <p:nvPr>
             <p:ph type="title"/>
@@ -1666,7 +1666,7 @@
       </p:sp>
       <p:sp>
         <p:nvSpPr>
-          <p:cNvPr id="17" name="Body Level One…"/>
+          <p:cNvPr id="22" name="Body Level One…"/>
           <p:cNvSpPr txBox="1"/>
           <p:nvPr>
             <p:ph type="body" sz="half" idx="1"/>
@@ -1788,7 +1788,7 @@
       </p:sp>
       <p:sp>
         <p:nvSpPr>
-          <p:cNvPr id="18" name="Slide Number"/>
+          <p:cNvPr id="23" name="Slide Number"/>
           <p:cNvSpPr txBox="1"/>
           <p:nvPr>
             <p:ph type="sldNum" sz="quarter" idx="2"/>
@@ -1836,7 +1836,7 @@
       </p:grpSpPr>
       <p:sp>
         <p:nvSpPr>
-          <p:cNvPr id="68" name="Background"/>
+          <p:cNvPr id="118" name="Background"/>
           <p:cNvSpPr/>
           <p:nvPr/>
         </p:nvSpPr>
@@ -1865,7 +1865,7 @@
       </p:sp>
       <p:sp>
         <p:nvSpPr>
-          <p:cNvPr id="69" name="Slide Number"/>
+          <p:cNvPr id="119" name="Slide Number"/>
           <p:cNvSpPr txBox="1"/>
           <p:nvPr>
             <p:ph type="sldNum" sz="quarter" idx="2"/>
@@ -1899,7 +1899,7 @@
       </p:sp>
       <p:sp>
         <p:nvSpPr>
-          <p:cNvPr id="70" name="Logo color"/>
+          <p:cNvPr id="120" name="Logo color"/>
           <p:cNvSpPr/>
           <p:nvPr/>
         </p:nvSpPr>
@@ -2408,7 +2408,7 @@
       </p:grpSpPr>
       <p:sp>
         <p:nvSpPr>
-          <p:cNvPr id="72" name="Logo color"/>
+          <p:cNvPr id="127" name="Logo color"/>
           <p:cNvSpPr/>
           <p:nvPr/>
         </p:nvSpPr>
@@ -2891,7 +2891,7 @@
       </p:sp>
       <p:sp>
         <p:nvSpPr>
-          <p:cNvPr id="73" name="Bottom bar"/>
+          <p:cNvPr id="128" name="Bottom bar"/>
           <p:cNvSpPr/>
           <p:nvPr/>
         </p:nvSpPr>
@@ -2929,7 +2929,7 @@
       </p:sp>
       <p:sp>
         <p:nvSpPr>
-          <p:cNvPr id="74" name="UserProfile.Offices.Workarea_{{DocumentLanguage}}text"/>
+          <p:cNvPr id="129" name="UserProfile.Offices.Workarea_{{DocumentLanguage}}text"/>
           <p:cNvSpPr txBox="1"/>
           <p:nvPr/>
         </p:nvSpPr>
@@ -2976,7 +2976,7 @@
       </p:sp>
       <p:sp>
         <p:nvSpPr>
-          <p:cNvPr id="75" name="Form.Datedate"/>
+          <p:cNvPr id="130" name="Form.Datedate"/>
           <p:cNvSpPr txBox="1"/>
           <p:nvPr/>
         </p:nvSpPr>
@@ -3023,7 +3023,7 @@
       </p:sp>
       <p:sp>
         <p:nvSpPr>
-          <p:cNvPr id="76" name="Top bar"/>
+          <p:cNvPr id="131" name="Top bar"/>
           <p:cNvSpPr/>
           <p:nvPr/>
         </p:nvSpPr>
@@ -3061,7 +3061,7 @@
       </p:sp>
       <p:sp>
         <p:nvSpPr>
-          <p:cNvPr id="77" name="Background"/>
+          <p:cNvPr id="132" name="Background"/>
           <p:cNvSpPr/>
           <p:nvPr/>
         </p:nvSpPr>
@@ -3090,7 +3090,7 @@
       </p:sp>
       <p:sp>
         <p:nvSpPr>
-          <p:cNvPr id="78" name="Logo color"/>
+          <p:cNvPr id="133" name="Logo color"/>
           <p:cNvSpPr/>
           <p:nvPr/>
         </p:nvSpPr>
@@ -3573,7 +3573,7 @@
       </p:sp>
       <p:sp>
         <p:nvSpPr>
-          <p:cNvPr id="79" name="Slide Number"/>
+          <p:cNvPr id="134" name="Slide Number"/>
           <p:cNvSpPr txBox="1"/>
           <p:nvPr>
             <p:ph type="sldNum" sz="quarter" idx="2"/>
@@ -3607,7 +3607,7 @@
       </p:sp>
       <p:sp>
         <p:nvSpPr>
-          <p:cNvPr id="80" name="Bottom bar"/>
+          <p:cNvPr id="135" name="Bottom bar"/>
           <p:cNvSpPr/>
           <p:nvPr/>
         </p:nvSpPr>
@@ -3645,7 +3645,7 @@
       </p:sp>
       <p:sp>
         <p:nvSpPr>
-          <p:cNvPr id="81" name="Top bar"/>
+          <p:cNvPr id="136" name="Top bar"/>
           <p:cNvSpPr/>
           <p:nvPr/>
         </p:nvSpPr>
@@ -3683,7 +3683,7 @@
       </p:sp>
       <p:pic>
         <p:nvPicPr>
-          <p:cNvPr id="82" name="Image" descr="Image"/>
+          <p:cNvPr id="137" name="Image" descr="Image"/>
           <p:cNvPicPr>
             <a:picLocks noChangeAspect="1"/>
           </p:cNvPicPr>
@@ -3738,7 +3738,7 @@
       </p:grpSpPr>
       <p:sp>
         <p:nvSpPr>
-          <p:cNvPr id="84" name="CustomShape 10"/>
+          <p:cNvPr id="144" name="CustomShape 10"/>
           <p:cNvSpPr/>
           <p:nvPr/>
         </p:nvSpPr>
@@ -4219,7 +4219,7 @@
       </p:sp>
       <p:sp>
         <p:nvSpPr>
-          <p:cNvPr id="85" name="CustomShape 11"/>
+          <p:cNvPr id="145" name="CustomShape 11"/>
           <p:cNvSpPr/>
           <p:nvPr/>
         </p:nvSpPr>
@@ -4253,7 +4253,7 @@
       </p:sp>
       <p:sp>
         <p:nvSpPr>
-          <p:cNvPr id="86" name="CustomShape 14"/>
+          <p:cNvPr id="146" name="CustomShape 14"/>
           <p:cNvSpPr/>
           <p:nvPr/>
         </p:nvSpPr>
@@ -4287,7 +4287,7 @@
       </p:sp>
       <p:sp>
         <p:nvSpPr>
-          <p:cNvPr id="87" name="UserProfile.Offices.Workarea_{{DocumentLanguage}}text"/>
+          <p:cNvPr id="147" name="UserProfile.Offices.Workarea_{{DocumentLanguage}}text"/>
           <p:cNvSpPr txBox="1"/>
           <p:nvPr/>
         </p:nvSpPr>
@@ -4334,7 +4334,7 @@
       </p:sp>
       <p:pic>
         <p:nvPicPr>
-          <p:cNvPr id="88" name="Image" descr="Image"/>
+          <p:cNvPr id="148" name="Image" descr="Image"/>
           <p:cNvPicPr>
             <a:picLocks noChangeAspect="1"/>
           </p:cNvPicPr>
@@ -4363,7 +4363,7 @@
       </p:pic>
       <p:sp>
         <p:nvSpPr>
-          <p:cNvPr id="89" name="Slide Number"/>
+          <p:cNvPr id="149" name="Slide Number"/>
           <p:cNvSpPr txBox="1"/>
           <p:nvPr>
             <p:ph type="sldNum" sz="quarter" idx="2"/>
@@ -4426,7 +4426,7 @@
       </p:grpSpPr>
       <p:sp>
         <p:nvSpPr>
-          <p:cNvPr id="20" name="Logo color"/>
+          <p:cNvPr id="30" name="Logo color"/>
           <p:cNvSpPr/>
           <p:nvPr/>
         </p:nvSpPr>
@@ -4909,7 +4909,7 @@
       </p:sp>
       <p:sp>
         <p:nvSpPr>
-          <p:cNvPr id="21" name="Bottom bar"/>
+          <p:cNvPr id="31" name="Bottom bar"/>
           <p:cNvSpPr/>
           <p:nvPr/>
         </p:nvSpPr>
@@ -4947,7 +4947,7 @@
       </p:sp>
       <p:sp>
         <p:nvSpPr>
-          <p:cNvPr id="22" name="UserProfile.Offices.Workarea_{{DocumentLanguage}}text"/>
+          <p:cNvPr id="32" name="UserProfile.Offices.Workarea_{{DocumentLanguage}}text"/>
           <p:cNvSpPr txBox="1"/>
           <p:nvPr/>
         </p:nvSpPr>
@@ -4994,7 +4994,7 @@
       </p:sp>
       <p:sp>
         <p:nvSpPr>
-          <p:cNvPr id="23" name="Top bar"/>
+          <p:cNvPr id="33" name="Top bar"/>
           <p:cNvSpPr/>
           <p:nvPr/>
         </p:nvSpPr>
@@ -5032,7 +5032,7 @@
       </p:sp>
       <p:sp>
         <p:nvSpPr>
-          <p:cNvPr id="24" name="Title Text"/>
+          <p:cNvPr id="34" name="Title Text"/>
           <p:cNvSpPr txBox="1"/>
           <p:nvPr>
             <p:ph type="title"/>
@@ -5069,7 +5069,7 @@
       </p:sp>
       <p:sp>
         <p:nvSpPr>
-          <p:cNvPr id="25" name="Body Level One…"/>
+          <p:cNvPr id="35" name="Body Level One…"/>
           <p:cNvSpPr txBox="1"/>
           <p:nvPr>
             <p:ph type="body" sz="half" idx="1"/>
@@ -5171,7 +5171,7 @@
       </p:sp>
       <p:sp>
         <p:nvSpPr>
-          <p:cNvPr id="26" name="Slide Number"/>
+          <p:cNvPr id="36" name="Slide Number"/>
           <p:cNvSpPr txBox="1"/>
           <p:nvPr>
             <p:ph type="sldNum" sz="quarter" idx="2"/>
@@ -5193,7 +5193,7 @@
       </p:sp>
       <p:pic>
         <p:nvPicPr>
-          <p:cNvPr id="27" name="Image" descr="Image"/>
+          <p:cNvPr id="37" name="Image" descr="Image"/>
           <p:cNvPicPr>
             <a:picLocks noChangeAspect="1"/>
           </p:cNvPicPr>
@@ -5248,7 +5248,7 @@
       </p:grpSpPr>
       <p:sp>
         <p:nvSpPr>
-          <p:cNvPr id="29" name="Logo color"/>
+          <p:cNvPr id="44" name="Logo color"/>
           <p:cNvSpPr/>
           <p:nvPr/>
         </p:nvSpPr>
@@ -5731,7 +5731,7 @@
       </p:sp>
       <p:sp>
         <p:nvSpPr>
-          <p:cNvPr id="30" name="Bottom bar"/>
+          <p:cNvPr id="45" name="Bottom bar"/>
           <p:cNvSpPr/>
           <p:nvPr/>
         </p:nvSpPr>
@@ -5769,7 +5769,7 @@
       </p:sp>
       <p:sp>
         <p:nvSpPr>
-          <p:cNvPr id="31" name="UserProfile.Offices.Workarea_{{DocumentLanguage}}text"/>
+          <p:cNvPr id="46" name="UserProfile.Offices.Workarea_{{DocumentLanguage}}text"/>
           <p:cNvSpPr txBox="1"/>
           <p:nvPr/>
         </p:nvSpPr>
@@ -5816,7 +5816,7 @@
       </p:sp>
       <p:sp>
         <p:nvSpPr>
-          <p:cNvPr id="32" name="Top bar"/>
+          <p:cNvPr id="47" name="Top bar"/>
           <p:cNvSpPr/>
           <p:nvPr/>
         </p:nvSpPr>
@@ -5854,7 +5854,7 @@
       </p:sp>
       <p:sp>
         <p:nvSpPr>
-          <p:cNvPr id="33" name="Title Text"/>
+          <p:cNvPr id="48" name="Title Text"/>
           <p:cNvSpPr txBox="1"/>
           <p:nvPr>
             <p:ph type="title"/>
@@ -5884,7 +5884,7 @@
       </p:sp>
       <p:sp>
         <p:nvSpPr>
-          <p:cNvPr id="34" name="Body Level One…"/>
+          <p:cNvPr id="49" name="Body Level One…"/>
           <p:cNvSpPr txBox="1"/>
           <p:nvPr>
             <p:ph type="body" idx="1"/>
@@ -5938,7 +5938,7 @@
       </p:sp>
       <p:sp>
         <p:nvSpPr>
-          <p:cNvPr id="35" name="Slide Number"/>
+          <p:cNvPr id="50" name="Slide Number"/>
           <p:cNvSpPr txBox="1"/>
           <p:nvPr>
             <p:ph type="sldNum" sz="quarter" idx="2"/>
@@ -5960,7 +5960,7 @@
       </p:sp>
       <p:pic>
         <p:nvPicPr>
-          <p:cNvPr id="36" name="Image" descr="Image"/>
+          <p:cNvPr id="51" name="Image" descr="Image"/>
           <p:cNvPicPr>
             <a:picLocks noChangeAspect="1"/>
           </p:cNvPicPr>
@@ -6015,7 +6015,7 @@
       </p:grpSpPr>
       <p:sp>
         <p:nvSpPr>
-          <p:cNvPr id="38" name="Title Text"/>
+          <p:cNvPr id="58" name="Title Text"/>
           <p:cNvSpPr txBox="1"/>
           <p:nvPr>
             <p:ph type="title"/>
@@ -6045,7 +6045,7 @@
       </p:sp>
       <p:sp>
         <p:nvSpPr>
-          <p:cNvPr id="39" name="Body Level One…"/>
+          <p:cNvPr id="59" name="Body Level One…"/>
           <p:cNvSpPr txBox="1"/>
           <p:nvPr>
             <p:ph type="body" sz="half" idx="1"/>
@@ -6099,7 +6099,7 @@
       </p:sp>
       <p:sp>
         <p:nvSpPr>
-          <p:cNvPr id="40" name="Slide Number"/>
+          <p:cNvPr id="60" name="Slide Number"/>
           <p:cNvSpPr txBox="1"/>
           <p:nvPr>
             <p:ph type="sldNum" sz="quarter" idx="2"/>
@@ -6147,7 +6147,7 @@
       </p:grpSpPr>
       <p:sp>
         <p:nvSpPr>
-          <p:cNvPr id="42" name="Title Text"/>
+          <p:cNvPr id="67" name="Title Text"/>
           <p:cNvSpPr txBox="1"/>
           <p:nvPr>
             <p:ph type="title"/>
@@ -6177,7 +6177,7 @@
       </p:sp>
       <p:sp>
         <p:nvSpPr>
-          <p:cNvPr id="43" name="Body Level One…"/>
+          <p:cNvPr id="68" name="Body Level One…"/>
           <p:cNvSpPr txBox="1"/>
           <p:nvPr>
             <p:ph type="body" sz="half" idx="1"/>
@@ -6231,7 +6231,7 @@
       </p:sp>
       <p:sp>
         <p:nvSpPr>
-          <p:cNvPr id="44" name="Picture Placeholder 9"/>
+          <p:cNvPr id="69" name="Picture Placeholder 9"/>
           <p:cNvSpPr/>
           <p:nvPr>
             <p:ph type="pic" sz="quarter" idx="21"/>
@@ -6256,7 +6256,7 @@
       </p:sp>
       <p:sp>
         <p:nvSpPr>
-          <p:cNvPr id="45" name="Picture Placeholder 11"/>
+          <p:cNvPr id="70" name="Picture Placeholder 11"/>
           <p:cNvSpPr/>
           <p:nvPr>
             <p:ph type="pic" sz="quarter" idx="22"/>
@@ -6281,7 +6281,7 @@
       </p:sp>
       <p:sp>
         <p:nvSpPr>
-          <p:cNvPr id="46" name="Slide Number"/>
+          <p:cNvPr id="71" name="Slide Number"/>
           <p:cNvSpPr txBox="1"/>
           <p:nvPr>
             <p:ph type="sldNum" sz="quarter" idx="2"/>
@@ -6329,7 +6329,7 @@
       </p:grpSpPr>
       <p:sp>
         <p:nvSpPr>
-          <p:cNvPr id="48" name="Title Text"/>
+          <p:cNvPr id="78" name="Title Text"/>
           <p:cNvSpPr txBox="1"/>
           <p:nvPr>
             <p:ph type="title"/>
@@ -6359,7 +6359,7 @@
       </p:sp>
       <p:sp>
         <p:nvSpPr>
-          <p:cNvPr id="49" name="Body Level One…"/>
+          <p:cNvPr id="79" name="Body Level One…"/>
           <p:cNvSpPr txBox="1"/>
           <p:nvPr>
             <p:ph type="body" sz="half" idx="1"/>
@@ -6413,7 +6413,7 @@
       </p:sp>
       <p:sp>
         <p:nvSpPr>
-          <p:cNvPr id="50" name="Picture Placeholder 9"/>
+          <p:cNvPr id="80" name="Picture Placeholder 9"/>
           <p:cNvSpPr/>
           <p:nvPr>
             <p:ph type="pic" sz="quarter" idx="21"/>
@@ -6438,7 +6438,7 @@
       </p:sp>
       <p:sp>
         <p:nvSpPr>
-          <p:cNvPr id="51" name="Picture Placeholder 11"/>
+          <p:cNvPr id="81" name="Picture Placeholder 11"/>
           <p:cNvSpPr/>
           <p:nvPr>
             <p:ph type="pic" sz="quarter" idx="22"/>
@@ -6463,7 +6463,7 @@
       </p:sp>
       <p:sp>
         <p:nvSpPr>
-          <p:cNvPr id="52" name="Slide Number"/>
+          <p:cNvPr id="82" name="Slide Number"/>
           <p:cNvSpPr txBox="1"/>
           <p:nvPr>
             <p:ph type="sldNum" sz="quarter" idx="2"/>
@@ -6511,7 +6511,7 @@
       </p:grpSpPr>
       <p:sp>
         <p:nvSpPr>
-          <p:cNvPr id="54" name="Title Text"/>
+          <p:cNvPr id="89" name="Title Text"/>
           <p:cNvSpPr txBox="1"/>
           <p:nvPr>
             <p:ph type="title"/>
@@ -6545,7 +6545,7 @@
       </p:sp>
       <p:sp>
         <p:nvSpPr>
-          <p:cNvPr id="55" name="Body Level One…"/>
+          <p:cNvPr id="90" name="Body Level One…"/>
           <p:cNvSpPr txBox="1"/>
           <p:nvPr>
             <p:ph type="body" sz="quarter" idx="1"/>
@@ -6630,7 +6630,7 @@
       </p:sp>
       <p:sp>
         <p:nvSpPr>
-          <p:cNvPr id="56" name="Text Placeholder 18"/>
+          <p:cNvPr id="91" name="Text Placeholder 18"/>
           <p:cNvSpPr/>
           <p:nvPr>
             <p:ph type="body" sz="quarter" idx="21"/>
@@ -6664,7 +6664,7 @@
       </p:sp>
       <p:sp>
         <p:nvSpPr>
-          <p:cNvPr id="57" name="Text Placeholder 22"/>
+          <p:cNvPr id="92" name="Text Placeholder 22"/>
           <p:cNvSpPr/>
           <p:nvPr>
             <p:ph type="body" sz="quarter" idx="22"/>
@@ -6698,7 +6698,7 @@
       </p:sp>
       <p:sp>
         <p:nvSpPr>
-          <p:cNvPr id="58" name="Picture Placeholder 8"/>
+          <p:cNvPr id="93" name="Picture Placeholder 8"/>
           <p:cNvSpPr/>
           <p:nvPr>
             <p:ph type="pic" sz="quarter" idx="23"/>
@@ -6723,7 +6723,7 @@
       </p:sp>
       <p:sp>
         <p:nvSpPr>
-          <p:cNvPr id="59" name="Picture Placeholder 8"/>
+          <p:cNvPr id="94" name="Picture Placeholder 8"/>
           <p:cNvSpPr/>
           <p:nvPr>
             <p:ph type="pic" sz="quarter" idx="24"/>
@@ -6748,7 +6748,7 @@
       </p:sp>
       <p:sp>
         <p:nvSpPr>
-          <p:cNvPr id="60" name="Picture Placeholder 8"/>
+          <p:cNvPr id="95" name="Picture Placeholder 8"/>
           <p:cNvSpPr/>
           <p:nvPr>
             <p:ph type="pic" sz="quarter" idx="25"/>
@@ -6773,7 +6773,7 @@
       </p:sp>
       <p:sp>
         <p:nvSpPr>
-          <p:cNvPr id="61" name="Slide Number"/>
+          <p:cNvPr id="96" name="Slide Number"/>
           <p:cNvSpPr txBox="1"/>
           <p:nvPr>
             <p:ph type="sldNum" sz="quarter" idx="2"/>
@@ -6821,7 +6821,7 @@
       </p:grpSpPr>
       <p:sp>
         <p:nvSpPr>
-          <p:cNvPr id="63" name="Title Text"/>
+          <p:cNvPr id="103" name="Title Text"/>
           <p:cNvSpPr txBox="1"/>
           <p:nvPr>
             <p:ph type="title"/>
@@ -6851,7 +6851,7 @@
       </p:sp>
       <p:sp>
         <p:nvSpPr>
-          <p:cNvPr id="64" name="Slide Number"/>
+          <p:cNvPr id="104" name="Slide Number"/>
           <p:cNvSpPr txBox="1"/>
           <p:nvPr>
             <p:ph type="sldNum" sz="quarter" idx="2"/>
@@ -6899,7 +6899,7 @@
       </p:grpSpPr>
       <p:sp>
         <p:nvSpPr>
-          <p:cNvPr id="66" name="Slide Number"/>
+          <p:cNvPr id="111" name="Slide Number"/>
           <p:cNvSpPr txBox="1"/>
           <p:nvPr>
             <p:ph type="sldNum" sz="quarter" idx="2"/>
@@ -8475,7 +8475,7 @@
       </p:grpSpPr>
       <p:sp>
         <p:nvSpPr>
-          <p:cNvPr id="93" name="Title 3"/>
+          <p:cNvPr id="158" name="Title 3"/>
           <p:cNvSpPr txBox="1"/>
           <p:nvPr>
             <p:ph type="title"/>
@@ -8511,7 +8511,7 @@
       </p:sp>
       <p:sp>
         <p:nvSpPr>
-          <p:cNvPr id="94" name="Subtitle 4"/>
+          <p:cNvPr id="159" name="Subtitle 4"/>
           <p:cNvSpPr txBox="1"/>
           <p:nvPr>
             <p:ph type="body" sz="half" idx="1"/>
@@ -8539,7 +8539,7 @@
       </p:sp>
       <p:sp>
         <p:nvSpPr>
-          <p:cNvPr id="95" name="Slide Number Placeholder 2"/>
+          <p:cNvPr id="160" name="Slide Number Placeholder 2"/>
           <p:cNvSpPr txBox="1"/>
           <p:nvPr>
             <p:ph type="sldNum" sz="quarter" idx="2"/>
@@ -8592,7 +8592,7 @@
       </p:grpSpPr>
       <p:sp>
         <p:nvSpPr>
-          <p:cNvPr id="158" name="Slide Number"/>
+          <p:cNvPr id="223" name="Slide Number"/>
           <p:cNvSpPr txBox="1"/>
           <p:nvPr>
             <p:ph type="sldNum" sz="quarter" idx="2"/>
@@ -8619,7 +8619,7 @@
       </p:sp>
       <p:sp>
         <p:nvSpPr>
-          <p:cNvPr id="159" name="CustomShape 1"/>
+          <p:cNvPr id="224" name="CustomShape 1"/>
           <p:cNvSpPr txBox="1"/>
           <p:nvPr/>
         </p:nvSpPr>
@@ -8661,7 +8661,7 @@
       </p:sp>
       <p:sp>
         <p:nvSpPr>
-          <p:cNvPr id="160" name="CustomShape 2"/>
+          <p:cNvPr id="225" name="CustomShape 2"/>
           <p:cNvSpPr txBox="1"/>
           <p:nvPr/>
         </p:nvSpPr>
@@ -8711,7 +8711,7 @@
       </p:sp>
       <p:pic>
         <p:nvPicPr>
-          <p:cNvPr id="161" name="image148.png" descr="image148.png"/>
+          <p:cNvPr id="226" name="image148.png" descr="image148.png"/>
           <p:cNvPicPr>
             <a:picLocks noChangeAspect="1"/>
           </p:cNvPicPr>
@@ -8740,7 +8740,7 @@
       </p:pic>
       <p:pic>
         <p:nvPicPr>
-          <p:cNvPr id="162" name="image149.png" descr="image149.png"/>
+          <p:cNvPr id="227" name="image149.png" descr="image149.png"/>
           <p:cNvPicPr>
             <a:picLocks noChangeAspect="1"/>
           </p:cNvPicPr>
@@ -8769,7 +8769,7 @@
       </p:pic>
       <p:pic>
         <p:nvPicPr>
-          <p:cNvPr id="163" name="image150.png" descr="image150.png"/>
+          <p:cNvPr id="228" name="image150.png" descr="image150.png"/>
           <p:cNvPicPr>
             <a:picLocks noChangeAspect="1"/>
           </p:cNvPicPr>
@@ -8798,7 +8798,7 @@
       </p:pic>
       <p:sp>
         <p:nvSpPr>
-          <p:cNvPr id="164" name="Rectangle"/>
+          <p:cNvPr id="229" name="Rectangle"/>
           <p:cNvSpPr/>
           <p:nvPr/>
         </p:nvSpPr>
@@ -8829,7 +8829,7 @@
       </p:sp>
       <p:sp>
         <p:nvSpPr>
-          <p:cNvPr id="165" name="Line"/>
+          <p:cNvPr id="230" name="Line"/>
           <p:cNvSpPr/>
           <p:nvPr/>
         </p:nvSpPr>
@@ -8857,7 +8857,7 @@
       </p:sp>
       <p:sp>
         <p:nvSpPr>
-          <p:cNvPr id="166" name="Line"/>
+          <p:cNvPr id="231" name="Line"/>
           <p:cNvSpPr/>
           <p:nvPr/>
         </p:nvSpPr>
@@ -8885,7 +8885,7 @@
       </p:sp>
       <p:sp>
         <p:nvSpPr>
-          <p:cNvPr id="167" name="Line"/>
+          <p:cNvPr id="232" name="Line"/>
           <p:cNvSpPr/>
           <p:nvPr/>
         </p:nvSpPr>
@@ -8913,7 +8913,7 @@
       </p:sp>
       <p:sp>
         <p:nvSpPr>
-          <p:cNvPr id="168" name="Line"/>
+          <p:cNvPr id="233" name="Line"/>
           <p:cNvSpPr/>
           <p:nvPr/>
         </p:nvSpPr>
@@ -8941,7 +8941,7 @@
       </p:sp>
       <p:sp>
         <p:nvSpPr>
-          <p:cNvPr id="169" name="Line"/>
+          <p:cNvPr id="234" name="Line"/>
           <p:cNvSpPr/>
           <p:nvPr/>
         </p:nvSpPr>
@@ -8969,7 +8969,7 @@
       </p:sp>
       <p:sp>
         <p:nvSpPr>
-          <p:cNvPr id="170" name="Oval"/>
+          <p:cNvPr id="235" name="Oval"/>
           <p:cNvSpPr/>
           <p:nvPr/>
         </p:nvSpPr>
@@ -9000,7 +9000,7 @@
       </p:sp>
       <p:sp>
         <p:nvSpPr>
-          <p:cNvPr id="178" name="Connection Line"/>
+          <p:cNvPr id="243" name="Connection Line"/>
           <p:cNvSpPr/>
           <p:nvPr/>
         </p:nvSpPr>
@@ -9057,7 +9057,7 @@
       </p:sp>
       <p:sp>
         <p:nvSpPr>
-          <p:cNvPr id="172" name="Oval"/>
+          <p:cNvPr id="237" name="Oval"/>
           <p:cNvSpPr/>
           <p:nvPr/>
         </p:nvSpPr>
@@ -9087,7 +9087,7 @@
       </p:sp>
       <p:sp>
         <p:nvSpPr>
-          <p:cNvPr id="173" name="Oval"/>
+          <p:cNvPr id="238" name="Oval"/>
           <p:cNvSpPr/>
           <p:nvPr/>
         </p:nvSpPr>
@@ -9117,7 +9117,7 @@
       </p:sp>
       <p:sp>
         <p:nvSpPr>
-          <p:cNvPr id="174" name="Line"/>
+          <p:cNvPr id="239" name="Line"/>
           <p:cNvSpPr/>
           <p:nvPr/>
         </p:nvSpPr>
@@ -9147,7 +9147,7 @@
       </p:sp>
       <p:sp>
         <p:nvSpPr>
-          <p:cNvPr id="175" name="Line"/>
+          <p:cNvPr id="240" name="Line"/>
           <p:cNvSpPr/>
           <p:nvPr/>
         </p:nvSpPr>
@@ -9177,7 +9177,7 @@
       </p:sp>
       <p:sp>
         <p:nvSpPr>
-          <p:cNvPr id="176" name="Rectangle"/>
+          <p:cNvPr id="241" name="Rectangle"/>
           <p:cNvSpPr/>
           <p:nvPr/>
         </p:nvSpPr>
@@ -9206,7 +9206,7 @@
       </p:sp>
       <p:sp>
         <p:nvSpPr>
-          <p:cNvPr id="177" name="CustomShape 1"/>
+          <p:cNvPr id="242" name="CustomShape 1"/>
           <p:cNvSpPr txBox="1"/>
           <p:nvPr/>
         </p:nvSpPr>
@@ -9280,7 +9280,7 @@
       </p:grpSpPr>
       <p:pic>
         <p:nvPicPr>
-          <p:cNvPr id="180" name="Screenshot 2021-05-05 at 22.08.43.png" descr="Screenshot 2021-05-05 at 22.08.43.png"/>
+          <p:cNvPr id="245" name="Screenshot 2021-05-05 at 22.08.43.png" descr="Screenshot 2021-05-05 at 22.08.43.png"/>
           <p:cNvPicPr>
             <a:picLocks noChangeAspect="1"/>
           </p:cNvPicPr>
@@ -9309,7 +9309,7 @@
       </p:pic>
       <p:sp>
         <p:nvSpPr>
-          <p:cNvPr id="181" name="Title 4"/>
+          <p:cNvPr id="246" name="Title 4"/>
           <p:cNvSpPr txBox="1"/>
           <p:nvPr>
             <p:ph type="title"/>
@@ -9337,7 +9337,7 @@
       </p:sp>
       <p:sp>
         <p:nvSpPr>
-          <p:cNvPr id="182" name="Content Placeholder 5"/>
+          <p:cNvPr id="247" name="Content Placeholder 5"/>
           <p:cNvSpPr txBox="1"/>
           <p:nvPr>
             <p:ph type="body" idx="1"/>
@@ -9380,7 +9380,7 @@
       </p:sp>
       <p:sp>
         <p:nvSpPr>
-          <p:cNvPr id="183" name="Slide Number Placeholder 3"/>
+          <p:cNvPr id="248" name="Slide Number Placeholder 3"/>
           <p:cNvSpPr txBox="1"/>
           <p:nvPr>
             <p:ph type="sldNum" sz="quarter" idx="2"/>
@@ -9407,7 +9407,7 @@
       </p:sp>
       <p:pic>
         <p:nvPicPr>
-          <p:cNvPr id="184" name="Picture 2" descr="Picture 2"/>
+          <p:cNvPr id="249" name="Picture 2" descr="Picture 2"/>
           <p:cNvPicPr>
             <a:picLocks noChangeAspect="1"/>
           </p:cNvPicPr>
@@ -9436,7 +9436,7 @@
       </p:pic>
       <p:pic>
         <p:nvPicPr>
-          <p:cNvPr id="185" name="Picture 4" descr="Picture 4"/>
+          <p:cNvPr id="250" name="Picture 4" descr="Picture 4"/>
           <p:cNvPicPr>
             <a:picLocks noChangeAspect="1"/>
           </p:cNvPicPr>
@@ -9491,7 +9491,7 @@
       </p:grpSpPr>
       <p:sp>
         <p:nvSpPr>
-          <p:cNvPr id="187" name="McStas samples with inelastic options"/>
+          <p:cNvPr id="252" name="McStas samples with inelastic options"/>
           <p:cNvSpPr txBox="1"/>
           <p:nvPr>
             <p:ph type="title"/>
@@ -9515,7 +9515,7 @@
       </p:sp>
       <p:sp>
         <p:nvSpPr>
-          <p:cNvPr id="188" name="Double-click to edit"/>
+          <p:cNvPr id="253" name="Double-click to edit"/>
           <p:cNvSpPr txBox="1"/>
           <p:nvPr>
             <p:ph type="body" idx="1"/>
@@ -9536,7 +9536,7 @@
       </p:sp>
       <p:sp>
         <p:nvSpPr>
-          <p:cNvPr id="189" name="Slide Number"/>
+          <p:cNvPr id="254" name="Slide Number"/>
           <p:cNvSpPr txBox="1"/>
           <p:nvPr>
             <p:ph type="sldNum" sz="quarter" idx="2"/>
@@ -9563,7 +9563,7 @@
       </p:sp>
       <p:pic>
         <p:nvPicPr>
-          <p:cNvPr id="190" name="Screenshot 2021-05-05 at 21.58.17.png" descr="Screenshot 2021-05-05 at 21.58.17.png"/>
+          <p:cNvPr id="255" name="Screenshot 2021-05-05 at 21.58.17.png" descr="Screenshot 2021-05-05 at 21.58.17.png"/>
           <p:cNvPicPr>
             <a:picLocks noChangeAspect="1"/>
           </p:cNvPicPr>
@@ -9592,7 +9592,7 @@
       </p:pic>
       <p:pic>
         <p:nvPicPr>
-          <p:cNvPr id="191" name="Screenshot 2021-05-05 at 21.54.43.png" descr="Screenshot 2021-05-05 at 21.54.43.png"/>
+          <p:cNvPr id="256" name="Screenshot 2021-05-05 at 21.54.43.png" descr="Screenshot 2021-05-05 at 21.54.43.png"/>
           <p:cNvPicPr>
             <a:picLocks noChangeAspect="1"/>
           </p:cNvPicPr>
@@ -9647,7 +9647,7 @@
       </p:grpSpPr>
       <p:grpSp>
         <p:nvGrpSpPr>
-          <p:cNvPr id="202" name="Group"/>
+          <p:cNvPr id="267" name="Group"/>
           <p:cNvGrpSpPr/>
           <p:nvPr/>
         </p:nvGrpSpPr>
@@ -9661,7 +9661,7 @@
         </p:grpSpPr>
         <p:pic>
           <p:nvPicPr>
-            <p:cNvPr id="193" name="Picture 15" descr="Picture 15"/>
+            <p:cNvPr id="258" name="Picture 15" descr="Picture 15"/>
             <p:cNvPicPr>
               <a:picLocks noChangeAspect="1"/>
             </p:cNvPicPr>
@@ -9692,7 +9692,7 @@
         </p:pic>
         <p:sp>
           <p:nvSpPr>
-            <p:cNvPr id="194" name="Straight Arrow Connector 2"/>
+            <p:cNvPr id="259" name="Straight Arrow Connector 2"/>
             <p:cNvSpPr/>
             <p:nvPr/>
           </p:nvSpPr>
@@ -9733,7 +9733,7 @@
         </p:sp>
         <p:sp>
           <p:nvSpPr>
-            <p:cNvPr id="195" name="Straight Arrow Connector 7"/>
+            <p:cNvPr id="260" name="Straight Arrow Connector 7"/>
             <p:cNvSpPr/>
             <p:nvPr/>
           </p:nvSpPr>
@@ -9774,7 +9774,7 @@
         </p:sp>
         <p:sp>
           <p:nvSpPr>
-            <p:cNvPr id="196" name="TextBox 5"/>
+            <p:cNvPr id="261" name="TextBox 5"/>
             <p:cNvSpPr txBox="1"/>
             <p:nvPr/>
           </p:nvSpPr>
@@ -9817,7 +9817,7 @@
         </p:sp>
         <p:sp>
           <p:nvSpPr>
-            <p:cNvPr id="197" name="TextBox 6"/>
+            <p:cNvPr id="262" name="TextBox 6"/>
             <p:cNvSpPr txBox="1"/>
             <p:nvPr/>
           </p:nvSpPr>
@@ -9860,7 +9860,7 @@
         </p:sp>
         <p:sp>
           <p:nvSpPr>
-            <p:cNvPr id="198" name="TextBox 11"/>
+            <p:cNvPr id="263" name="TextBox 11"/>
             <p:cNvSpPr txBox="1"/>
             <p:nvPr/>
           </p:nvSpPr>
@@ -9905,7 +9905,7 @@
         </p:sp>
         <p:sp>
           <p:nvSpPr>
-            <p:cNvPr id="199" name="Oval 8"/>
+            <p:cNvPr id="264" name="Oval 8"/>
             <p:cNvSpPr/>
             <p:nvPr/>
           </p:nvSpPr>
@@ -9941,7 +9941,7 @@
         </p:sp>
         <p:sp>
           <p:nvSpPr>
-            <p:cNvPr id="200" name="Rectangle 9"/>
+            <p:cNvPr id="265" name="Rectangle 9"/>
             <p:cNvSpPr/>
             <p:nvPr/>
           </p:nvSpPr>
@@ -9977,7 +9977,7 @@
         </p:sp>
         <p:sp>
           <p:nvSpPr>
-            <p:cNvPr id="201" name="Content Placeholder 5"/>
+            <p:cNvPr id="266" name="Content Placeholder 5"/>
             <p:cNvSpPr txBox="1"/>
             <p:nvPr/>
           </p:nvSpPr>
@@ -10026,13 +10026,17 @@
       </p:grpSp>
       <p:sp>
         <p:nvSpPr>
-          <p:cNvPr id="203" name="Title 4"/>
+          <p:cNvPr id="268" name="Title 4"/>
           <p:cNvSpPr txBox="1"/>
           <p:nvPr>
             <p:ph type="title"/>
           </p:nvPr>
         </p:nvSpPr>
         <p:spPr>
+          <a:xfrm>
+            <a:off x="1774725" y="-208874"/>
+            <a:ext cx="9312376" cy="972718"/>
+          </a:xfrm>
           <a:prstGeom prst="rect">
             <a:avLst/>
           </a:prstGeom>
@@ -10050,13 +10054,17 @@
       </p:sp>
       <p:sp>
         <p:nvSpPr>
-          <p:cNvPr id="204" name="Content Placeholder 5"/>
+          <p:cNvPr id="269" name="Content Placeholder 5"/>
           <p:cNvSpPr txBox="1"/>
           <p:nvPr>
             <p:ph type="body" idx="1"/>
           </p:nvPr>
         </p:nvSpPr>
         <p:spPr>
+          <a:xfrm>
+            <a:off x="1774800" y="1071399"/>
+            <a:ext cx="9312375" cy="4545579"/>
+          </a:xfrm>
           <a:prstGeom prst="rect">
             <a:avLst/>
           </a:prstGeom>
@@ -10074,7 +10082,7 @@
       </p:sp>
       <p:sp>
         <p:nvSpPr>
-          <p:cNvPr id="205" name="Slide Number Placeholder 3"/>
+          <p:cNvPr id="270" name="Slide Number Placeholder 3"/>
           <p:cNvSpPr txBox="1"/>
           <p:nvPr>
             <p:ph type="sldNum" sz="quarter" idx="2"/>
@@ -10101,7 +10109,7 @@
       </p:sp>
       <p:pic>
         <p:nvPicPr>
-          <p:cNvPr id="206" name="Picture 5" descr="Picture 5"/>
+          <p:cNvPr id="271" name="Picture 5" descr="Picture 5"/>
           <p:cNvPicPr>
             <a:picLocks noChangeAspect="1"/>
           </p:cNvPicPr>
@@ -10117,7 +10125,7 @@
         </p:blipFill>
         <p:spPr>
           <a:xfrm>
-            <a:off x="3199659" y="1250860"/>
+            <a:off x="3199659" y="2139860"/>
             <a:ext cx="2413001" cy="457201"/>
           </a:xfrm>
           <a:prstGeom prst="rect">
@@ -10130,13 +10138,13 @@
       </p:pic>
       <p:sp>
         <p:nvSpPr>
-          <p:cNvPr id="207" name="TextBox 15"/>
+          <p:cNvPr id="272" name="TextBox 15"/>
           <p:cNvSpPr txBox="1"/>
           <p:nvPr/>
         </p:nvSpPr>
         <p:spPr>
           <a:xfrm>
-            <a:off x="2055238" y="1368483"/>
+            <a:off x="2055238" y="2257483"/>
             <a:ext cx="1172194" cy="221954"/>
           </a:xfrm>
           <a:prstGeom prst="rect">
@@ -10192,7 +10200,7 @@
       </p:grpSpPr>
       <p:sp>
         <p:nvSpPr>
-          <p:cNvPr id="209" name="Title 4"/>
+          <p:cNvPr id="274" name="Title 4"/>
           <p:cNvSpPr txBox="1"/>
           <p:nvPr>
             <p:ph type="title"/>
@@ -10220,7 +10228,7 @@
       </p:sp>
       <p:sp>
         <p:nvSpPr>
-          <p:cNvPr id="210" name="Content Placeholder 5"/>
+          <p:cNvPr id="275" name="Content Placeholder 5"/>
           <p:cNvSpPr txBox="1"/>
           <p:nvPr>
             <p:ph type="body" idx="1"/>
@@ -10293,7 +10301,7 @@
       </p:sp>
       <p:sp>
         <p:nvSpPr>
-          <p:cNvPr id="211" name="Slide Number Placeholder 3"/>
+          <p:cNvPr id="276" name="Slide Number Placeholder 3"/>
           <p:cNvSpPr txBox="1"/>
           <p:nvPr>
             <p:ph type="sldNum" sz="quarter" idx="2"/>
@@ -10320,7 +10328,7 @@
       </p:sp>
       <p:pic>
         <p:nvPicPr>
-          <p:cNvPr id="212" name="Picture 2" descr="Picture 2"/>
+          <p:cNvPr id="277" name="Picture 2" descr="Picture 2"/>
           <p:cNvPicPr>
             <a:picLocks noChangeAspect="1"/>
           </p:cNvPicPr>
@@ -10350,7 +10358,7 @@
       </p:pic>
       <p:sp>
         <p:nvSpPr>
-          <p:cNvPr id="213" name="TextBox 3"/>
+          <p:cNvPr id="278" name="TextBox 3"/>
           <p:cNvSpPr txBox="1"/>
           <p:nvPr/>
         </p:nvSpPr>
@@ -10420,7 +10428,7 @@
       </p:grpSpPr>
       <p:sp>
         <p:nvSpPr>
-          <p:cNvPr id="215" name="Title 4"/>
+          <p:cNvPr id="280" name="Title 4"/>
           <p:cNvSpPr txBox="1"/>
           <p:nvPr>
             <p:ph type="title"/>
@@ -10448,7 +10456,7 @@
       </p:sp>
       <p:sp>
         <p:nvSpPr>
-          <p:cNvPr id="216" name="Content Placeholder 5"/>
+          <p:cNvPr id="281" name="Content Placeholder 5"/>
           <p:cNvSpPr txBox="1"/>
           <p:nvPr>
             <p:ph type="body" idx="1"/>
@@ -10484,7 +10492,7 @@
       </p:sp>
       <p:sp>
         <p:nvSpPr>
-          <p:cNvPr id="217" name="Slide Number Placeholder 3"/>
+          <p:cNvPr id="282" name="Slide Number Placeholder 3"/>
           <p:cNvSpPr txBox="1"/>
           <p:nvPr>
             <p:ph type="sldNum" sz="quarter" idx="2"/>
@@ -10511,7 +10519,7 @@
       </p:sp>
       <p:pic>
         <p:nvPicPr>
-          <p:cNvPr id="218" name="Picture 2" descr="Picture 2"/>
+          <p:cNvPr id="283" name="Picture 2" descr="Picture 2"/>
           <p:cNvPicPr>
             <a:picLocks noChangeAspect="1"/>
           </p:cNvPicPr>
@@ -10540,7 +10548,7 @@
       </p:pic>
       <p:pic>
         <p:nvPicPr>
-          <p:cNvPr id="219" name="Picture 2" descr="Picture 2"/>
+          <p:cNvPr id="284" name="Picture 2" descr="Picture 2"/>
           <p:cNvPicPr>
             <a:picLocks noChangeAspect="1"/>
           </p:cNvPicPr>
@@ -10595,7 +10603,7 @@
       </p:grpSpPr>
       <p:sp>
         <p:nvSpPr>
-          <p:cNvPr id="221" name="Example component"/>
+          <p:cNvPr id="286" name="Example component"/>
           <p:cNvSpPr txBox="1"/>
           <p:nvPr>
             <p:ph type="title"/>
@@ -10619,7 +10627,7 @@
       </p:sp>
       <p:sp>
         <p:nvSpPr>
-          <p:cNvPr id="222" name="Single_crystal_inelastic…"/>
+          <p:cNvPr id="287" name="Single_crystal_inelastic…"/>
           <p:cNvSpPr txBox="1"/>
           <p:nvPr>
             <p:ph type="body" idx="1"/>
@@ -10671,7 +10679,7 @@
       </p:sp>
       <p:sp>
         <p:nvSpPr>
-          <p:cNvPr id="223" name="Slide Number"/>
+          <p:cNvPr id="288" name="Slide Number"/>
           <p:cNvSpPr txBox="1"/>
           <p:nvPr>
             <p:ph type="sldNum" sz="quarter" idx="2"/>
@@ -10724,7 +10732,7 @@
       </p:grpSpPr>
       <p:sp>
         <p:nvSpPr>
-          <p:cNvPr id="225" name="Title 4"/>
+          <p:cNvPr id="290" name="Title 4"/>
           <p:cNvSpPr txBox="1"/>
           <p:nvPr>
             <p:ph type="title"/>
@@ -10752,7 +10760,7 @@
       </p:sp>
       <p:sp>
         <p:nvSpPr>
-          <p:cNvPr id="226" name="Content Placeholder 5"/>
+          <p:cNvPr id="291" name="Content Placeholder 5"/>
           <p:cNvSpPr txBox="1"/>
           <p:nvPr>
             <p:ph type="body" idx="1"/>
@@ -10792,7 +10800,7 @@
       </p:sp>
       <p:sp>
         <p:nvSpPr>
-          <p:cNvPr id="227" name="Slide Number Placeholder 3"/>
+          <p:cNvPr id="292" name="Slide Number Placeholder 3"/>
           <p:cNvSpPr txBox="1"/>
           <p:nvPr>
             <p:ph type="sldNum" sz="quarter" idx="2"/>
@@ -10819,7 +10827,7 @@
       </p:sp>
       <p:sp>
         <p:nvSpPr>
-          <p:cNvPr id="228" name="Straight Arrow Connector 2"/>
+          <p:cNvPr id="293" name="Straight Arrow Connector 2"/>
           <p:cNvSpPr/>
           <p:nvPr/>
         </p:nvSpPr>
@@ -10855,7 +10863,7 @@
       </p:sp>
       <p:sp>
         <p:nvSpPr>
-          <p:cNvPr id="229" name="Straight Arrow Connector 7"/>
+          <p:cNvPr id="294" name="Straight Arrow Connector 7"/>
           <p:cNvSpPr/>
           <p:nvPr/>
         </p:nvSpPr>
@@ -10891,7 +10899,7 @@
       </p:sp>
       <p:sp>
         <p:nvSpPr>
-          <p:cNvPr id="230" name="Straight Arrow Connector 9"/>
+          <p:cNvPr id="295" name="Straight Arrow Connector 9"/>
           <p:cNvSpPr/>
           <p:nvPr/>
         </p:nvSpPr>
@@ -10927,7 +10935,7 @@
       </p:sp>
       <p:sp>
         <p:nvSpPr>
-          <p:cNvPr id="231" name="Straight Connector 15"/>
+          <p:cNvPr id="296" name="Straight Connector 15"/>
           <p:cNvSpPr/>
           <p:nvPr/>
         </p:nvSpPr>
@@ -10962,7 +10970,7 @@
       </p:sp>
       <p:sp>
         <p:nvSpPr>
-          <p:cNvPr id="232" name="Straight Connector 20"/>
+          <p:cNvPr id="297" name="Straight Connector 20"/>
           <p:cNvSpPr/>
           <p:nvPr/>
         </p:nvSpPr>
@@ -10997,7 +11005,7 @@
       </p:sp>
       <p:sp>
         <p:nvSpPr>
-          <p:cNvPr id="233" name="Straight Connector 22"/>
+          <p:cNvPr id="298" name="Straight Connector 22"/>
           <p:cNvSpPr/>
           <p:nvPr/>
         </p:nvSpPr>
@@ -11032,7 +11040,7 @@
       </p:sp>
       <p:sp>
         <p:nvSpPr>
-          <p:cNvPr id="234" name="Straight Connector 23"/>
+          <p:cNvPr id="299" name="Straight Connector 23"/>
           <p:cNvSpPr/>
           <p:nvPr/>
         </p:nvSpPr>
@@ -11067,7 +11075,7 @@
       </p:sp>
       <p:sp>
         <p:nvSpPr>
-          <p:cNvPr id="235" name="Straight Connector 24"/>
+          <p:cNvPr id="300" name="Straight Connector 24"/>
           <p:cNvSpPr/>
           <p:nvPr/>
         </p:nvSpPr>
@@ -11102,7 +11110,7 @@
       </p:sp>
       <p:sp>
         <p:nvSpPr>
-          <p:cNvPr id="236" name="Straight Connector 25"/>
+          <p:cNvPr id="301" name="Straight Connector 25"/>
           <p:cNvSpPr/>
           <p:nvPr/>
         </p:nvSpPr>
@@ -11137,7 +11145,7 @@
       </p:sp>
       <p:sp>
         <p:nvSpPr>
-          <p:cNvPr id="237" name="Straight Connector 26"/>
+          <p:cNvPr id="302" name="Straight Connector 26"/>
           <p:cNvSpPr/>
           <p:nvPr/>
         </p:nvSpPr>
@@ -11172,7 +11180,7 @@
       </p:sp>
       <p:sp>
         <p:nvSpPr>
-          <p:cNvPr id="238" name="Straight Connector 27"/>
+          <p:cNvPr id="303" name="Straight Connector 27"/>
           <p:cNvSpPr/>
           <p:nvPr/>
         </p:nvSpPr>
@@ -11207,7 +11215,7 @@
       </p:sp>
       <p:sp>
         <p:nvSpPr>
-          <p:cNvPr id="239" name="Straight Connector 30"/>
+          <p:cNvPr id="304" name="Straight Connector 30"/>
           <p:cNvSpPr/>
           <p:nvPr/>
         </p:nvSpPr>
@@ -11242,7 +11250,7 @@
       </p:sp>
       <p:sp>
         <p:nvSpPr>
-          <p:cNvPr id="240" name="Straight Connector 34"/>
+          <p:cNvPr id="305" name="Straight Connector 34"/>
           <p:cNvSpPr/>
           <p:nvPr/>
         </p:nvSpPr>
@@ -11277,7 +11285,7 @@
       </p:sp>
       <p:sp>
         <p:nvSpPr>
-          <p:cNvPr id="241" name="Straight Connector 35"/>
+          <p:cNvPr id="306" name="Straight Connector 35"/>
           <p:cNvSpPr/>
           <p:nvPr/>
         </p:nvSpPr>
@@ -11312,7 +11320,7 @@
       </p:sp>
       <p:sp>
         <p:nvSpPr>
-          <p:cNvPr id="242" name="Straight Connector 36"/>
+          <p:cNvPr id="307" name="Straight Connector 36"/>
           <p:cNvSpPr/>
           <p:nvPr/>
         </p:nvSpPr>
@@ -11347,7 +11355,7 @@
       </p:sp>
       <p:sp>
         <p:nvSpPr>
-          <p:cNvPr id="243" name="TextBox 37"/>
+          <p:cNvPr id="308" name="TextBox 37"/>
           <p:cNvSpPr txBox="1"/>
           <p:nvPr/>
         </p:nvSpPr>
@@ -11389,7 +11397,7 @@
       </p:sp>
       <p:sp>
         <p:nvSpPr>
-          <p:cNvPr id="244" name="TextBox 38"/>
+          <p:cNvPr id="309" name="TextBox 38"/>
           <p:cNvSpPr txBox="1"/>
           <p:nvPr/>
         </p:nvSpPr>
@@ -11431,7 +11439,7 @@
       </p:sp>
       <p:sp>
         <p:nvSpPr>
-          <p:cNvPr id="245" name="TextBox 39"/>
+          <p:cNvPr id="310" name="TextBox 39"/>
           <p:cNvSpPr txBox="1"/>
           <p:nvPr/>
         </p:nvSpPr>
@@ -11473,7 +11481,7 @@
       </p:sp>
       <p:sp>
         <p:nvSpPr>
-          <p:cNvPr id="246" name="TextBox 40"/>
+          <p:cNvPr id="311" name="TextBox 40"/>
           <p:cNvSpPr txBox="1"/>
           <p:nvPr/>
         </p:nvSpPr>
@@ -11515,7 +11523,7 @@
       </p:sp>
       <p:sp>
         <p:nvSpPr>
-          <p:cNvPr id="247" name="TextBox 28"/>
+          <p:cNvPr id="312" name="TextBox 28"/>
           <p:cNvSpPr txBox="1"/>
           <p:nvPr/>
         </p:nvSpPr>
@@ -11557,13 +11565,13 @@
       </p:sp>
       <p:sp>
         <p:nvSpPr>
-          <p:cNvPr id="248" name="TextBox 29"/>
+          <p:cNvPr id="313" name="TextBox 29"/>
           <p:cNvSpPr txBox="1"/>
           <p:nvPr/>
         </p:nvSpPr>
         <p:spPr>
           <a:xfrm>
-            <a:off x="4131838" y="3937925"/>
+            <a:off x="4131838" y="4064925"/>
             <a:ext cx="672778" cy="374147"/>
           </a:xfrm>
           <a:prstGeom prst="rect">
@@ -11599,7 +11607,7 @@
       </p:sp>
       <p:sp>
         <p:nvSpPr>
-          <p:cNvPr id="249" name="TextBox 31"/>
+          <p:cNvPr id="314" name="TextBox 31"/>
           <p:cNvSpPr txBox="1"/>
           <p:nvPr/>
         </p:nvSpPr>
@@ -11641,7 +11649,7 @@
       </p:sp>
       <p:sp>
         <p:nvSpPr>
-          <p:cNvPr id="250" name="TextBox 32"/>
+          <p:cNvPr id="315" name="TextBox 32"/>
           <p:cNvSpPr txBox="1"/>
           <p:nvPr/>
         </p:nvSpPr>
@@ -11709,7 +11717,7 @@
       </p:grpSpPr>
       <p:sp>
         <p:nvSpPr>
-          <p:cNvPr id="252" name="Title 4"/>
+          <p:cNvPr id="317" name="Title 4"/>
           <p:cNvSpPr txBox="1"/>
           <p:nvPr>
             <p:ph type="title"/>
@@ -11733,7 +11741,7 @@
       </p:sp>
       <p:sp>
         <p:nvSpPr>
-          <p:cNvPr id="253" name="Content Placeholder 5"/>
+          <p:cNvPr id="318" name="Content Placeholder 5"/>
           <p:cNvSpPr txBox="1"/>
           <p:nvPr>
             <p:ph type="body" idx="1"/>
@@ -11757,7 +11765,7 @@
       </p:sp>
       <p:sp>
         <p:nvSpPr>
-          <p:cNvPr id="254" name="Slide Number Placeholder 3"/>
+          <p:cNvPr id="319" name="Slide Number Placeholder 3"/>
           <p:cNvSpPr txBox="1"/>
           <p:nvPr>
             <p:ph type="sldNum" sz="quarter" idx="2"/>
@@ -11784,7 +11792,7 @@
       </p:sp>
       <p:pic>
         <p:nvPicPr>
-          <p:cNvPr id="255" name="Picture 2" descr="Picture 2"/>
+          <p:cNvPr id="320" name="Picture 2" descr="Picture 2"/>
           <p:cNvPicPr>
             <a:picLocks noChangeAspect="1"/>
           </p:cNvPicPr>
@@ -11840,7 +11848,7 @@
       </p:grpSpPr>
       <p:sp>
         <p:nvSpPr>
-          <p:cNvPr id="257" name="Title 4"/>
+          <p:cNvPr id="322" name="Title 4"/>
           <p:cNvSpPr txBox="1"/>
           <p:nvPr>
             <p:ph type="title"/>
@@ -11864,7 +11872,7 @@
       </p:sp>
       <p:sp>
         <p:nvSpPr>
-          <p:cNvPr id="258" name="Slide Number Placeholder 3"/>
+          <p:cNvPr id="323" name="Slide Number Placeholder 3"/>
           <p:cNvSpPr txBox="1"/>
           <p:nvPr>
             <p:ph type="sldNum" sz="quarter" idx="2"/>
@@ -11891,7 +11899,7 @@
       </p:sp>
       <p:pic>
         <p:nvPicPr>
-          <p:cNvPr id="259" name="Picture 3" descr="Picture 3"/>
+          <p:cNvPr id="324" name="Picture 3" descr="Picture 3"/>
           <p:cNvPicPr>
             <a:picLocks noChangeAspect="1"/>
           </p:cNvPicPr>
@@ -11920,13 +11928,17 @@
       </p:pic>
       <p:sp>
         <p:nvSpPr>
-          <p:cNvPr id="260" name="Content Placeholder 5"/>
+          <p:cNvPr id="325" name="Content Placeholder 5"/>
           <p:cNvSpPr txBox="1"/>
           <p:nvPr>
             <p:ph type="body" idx="1"/>
           </p:nvPr>
         </p:nvSpPr>
         <p:spPr>
+          <a:xfrm>
+            <a:off x="1774800" y="1452399"/>
+            <a:ext cx="9312375" cy="4545579"/>
+          </a:xfrm>
           <a:prstGeom prst="rect">
             <a:avLst/>
           </a:prstGeom>
@@ -11970,7 +11982,7 @@
       </p:grpSpPr>
       <p:sp>
         <p:nvSpPr>
-          <p:cNvPr id="97" name="Title 4"/>
+          <p:cNvPr id="162" name="Title 4"/>
           <p:cNvSpPr txBox="1"/>
           <p:nvPr>
             <p:ph type="title"/>
@@ -11998,7 +12010,7 @@
       </p:sp>
       <p:sp>
         <p:nvSpPr>
-          <p:cNvPr id="98" name="Content Placeholder 5"/>
+          <p:cNvPr id="163" name="Content Placeholder 5"/>
           <p:cNvSpPr txBox="1"/>
           <p:nvPr>
             <p:ph type="body" idx="1"/>
@@ -12078,7 +12090,7 @@
       </p:sp>
       <p:sp>
         <p:nvSpPr>
-          <p:cNvPr id="99" name="Slide Number Placeholder 3"/>
+          <p:cNvPr id="164" name="Slide Number Placeholder 3"/>
           <p:cNvSpPr txBox="1"/>
           <p:nvPr>
             <p:ph type="sldNum" sz="quarter" idx="2"/>
@@ -12131,7 +12143,7 @@
       </p:grpSpPr>
       <p:sp>
         <p:nvSpPr>
-          <p:cNvPr id="262" name="Title 4"/>
+          <p:cNvPr id="327" name="Title 4"/>
           <p:cNvSpPr txBox="1"/>
           <p:nvPr>
             <p:ph type="title"/>
@@ -12159,7 +12171,7 @@
       </p:sp>
       <p:sp>
         <p:nvSpPr>
-          <p:cNvPr id="263" name="Content Placeholder 5"/>
+          <p:cNvPr id="328" name="Content Placeholder 5"/>
           <p:cNvSpPr txBox="1"/>
           <p:nvPr>
             <p:ph type="body" idx="1"/>
@@ -12258,7 +12270,7 @@
       </p:sp>
       <p:sp>
         <p:nvSpPr>
-          <p:cNvPr id="264" name="Slide Number Placeholder 3"/>
+          <p:cNvPr id="329" name="Slide Number Placeholder 3"/>
           <p:cNvSpPr txBox="1"/>
           <p:nvPr>
             <p:ph type="sldNum" sz="quarter" idx="2"/>
@@ -12311,7 +12323,7 @@
       </p:grpSpPr>
       <p:pic>
         <p:nvPicPr>
-          <p:cNvPr id="101" name="Picture 4" descr="Picture 4"/>
+          <p:cNvPr id="166" name="Picture 4" descr="Picture 4"/>
           <p:cNvPicPr>
             <a:picLocks noChangeAspect="1"/>
           </p:cNvPicPr>
@@ -12340,7 +12352,7 @@
       </p:pic>
       <p:sp>
         <p:nvSpPr>
-          <p:cNvPr id="102" name="Slide Number"/>
+          <p:cNvPr id="167" name="Slide Number"/>
           <p:cNvSpPr txBox="1"/>
           <p:nvPr>
             <p:ph type="sldNum" sz="quarter" idx="2"/>
@@ -12367,7 +12379,7 @@
       </p:sp>
       <p:sp>
         <p:nvSpPr>
-          <p:cNvPr id="103" name="TextShape 1"/>
+          <p:cNvPr id="168" name="TextShape 1"/>
           <p:cNvSpPr txBox="1"/>
           <p:nvPr/>
         </p:nvSpPr>
@@ -12407,7 +12419,7 @@
       </p:sp>
       <p:pic>
         <p:nvPicPr>
-          <p:cNvPr id="104" name="Picture 3" descr="Picture 3"/>
+          <p:cNvPr id="169" name="Picture 3" descr="Picture 3"/>
           <p:cNvPicPr>
             <a:picLocks noChangeAspect="1"/>
           </p:cNvPicPr>
@@ -12436,7 +12448,7 @@
       </p:pic>
       <p:sp>
         <p:nvSpPr>
-          <p:cNvPr id="105" name="CustomShape 2"/>
+          <p:cNvPr id="170" name="CustomShape 2"/>
           <p:cNvSpPr txBox="1"/>
           <p:nvPr/>
         </p:nvSpPr>
@@ -12508,7 +12520,7 @@
       </p:sp>
       <p:sp>
         <p:nvSpPr>
-          <p:cNvPr id="106" name="TextShape 2"/>
+          <p:cNvPr id="171" name="TextShape 2"/>
           <p:cNvSpPr txBox="1"/>
           <p:nvPr/>
         </p:nvSpPr>
@@ -12684,7 +12696,7 @@
       </p:sp>
       <p:grpSp>
         <p:nvGrpSpPr>
-          <p:cNvPr id="109" name="Group"/>
+          <p:cNvPr id="174" name="Group"/>
           <p:cNvGrpSpPr/>
           <p:nvPr/>
         </p:nvGrpSpPr>
@@ -12698,7 +12710,7 @@
         </p:grpSpPr>
         <p:pic>
           <p:nvPicPr>
-            <p:cNvPr id="107" name="Picture 6" descr="Picture 6"/>
+            <p:cNvPr id="172" name="Picture 6" descr="Picture 6"/>
             <p:cNvPicPr>
               <a:picLocks noChangeAspect="1"/>
             </p:cNvPicPr>
@@ -12729,7 +12741,7 @@
         </p:pic>
         <p:pic>
           <p:nvPicPr>
-            <p:cNvPr id="108" name="Picture 7" descr="Picture 7"/>
+            <p:cNvPr id="173" name="Picture 7" descr="Picture 7"/>
             <p:cNvPicPr>
               <a:picLocks noChangeAspect="1"/>
             </p:cNvPicPr>
@@ -12787,7 +12799,7 @@
       </p:grpSpPr>
       <p:sp>
         <p:nvSpPr>
-          <p:cNvPr id="111" name="SANS models in McStas"/>
+          <p:cNvPr id="176" name="SANS models in McStas"/>
           <p:cNvSpPr txBox="1"/>
           <p:nvPr>
             <p:ph type="title"/>
@@ -12811,7 +12823,7 @@
       </p:sp>
       <p:sp>
         <p:nvSpPr>
-          <p:cNvPr id="112" name="Slide Number"/>
+          <p:cNvPr id="177" name="Slide Number"/>
           <p:cNvSpPr txBox="1"/>
           <p:nvPr>
             <p:ph type="sldNum" sz="quarter" idx="2"/>
@@ -12838,7 +12850,7 @@
       </p:sp>
       <p:pic>
         <p:nvPicPr>
-          <p:cNvPr id="113" name="Screenshot 2021-05-05 at 21.56.51.png" descr="Screenshot 2021-05-05 at 21.56.51.png"/>
+          <p:cNvPr id="178" name="Screenshot 2021-05-05 at 21.56.51.png" descr="Screenshot 2021-05-05 at 21.56.51.png"/>
           <p:cNvPicPr>
             <a:picLocks noChangeAspect="1"/>
           </p:cNvPicPr>
@@ -12893,7 +12905,7 @@
       </p:grpSpPr>
       <p:sp>
         <p:nvSpPr>
-          <p:cNvPr id="115" name="Slide Number"/>
+          <p:cNvPr id="180" name="Slide Number"/>
           <p:cNvSpPr txBox="1"/>
           <p:nvPr>
             <p:ph type="sldNum" sz="quarter" idx="2"/>
@@ -12920,7 +12932,7 @@
       </p:sp>
       <p:sp>
         <p:nvSpPr>
-          <p:cNvPr id="116" name="TextShape 1"/>
+          <p:cNvPr id="181" name="TextShape 1"/>
           <p:cNvSpPr txBox="1"/>
           <p:nvPr/>
         </p:nvSpPr>
@@ -12960,7 +12972,7 @@
       </p:sp>
       <p:pic>
         <p:nvPicPr>
-          <p:cNvPr id="117" name="image156.png" descr="image156.png"/>
+          <p:cNvPr id="182" name="image156.png" descr="image156.png"/>
           <p:cNvPicPr>
             <a:picLocks noChangeAspect="1"/>
           </p:cNvPicPr>
@@ -12989,7 +13001,7 @@
       </p:pic>
       <p:sp>
         <p:nvSpPr>
-          <p:cNvPr id="118" name="CustomShape 2"/>
+          <p:cNvPr id="183" name="CustomShape 2"/>
           <p:cNvSpPr/>
           <p:nvPr/>
         </p:nvSpPr>
@@ -13017,7 +13029,7 @@
       </p:sp>
       <p:sp>
         <p:nvSpPr>
-          <p:cNvPr id="119" name="TextShape 3"/>
+          <p:cNvPr id="184" name="TextShape 3"/>
           <p:cNvSpPr txBox="1"/>
           <p:nvPr/>
         </p:nvSpPr>
@@ -13085,7 +13097,7 @@
       </p:grpSpPr>
       <p:sp>
         <p:nvSpPr>
-          <p:cNvPr id="121" name="Reflectometry"/>
+          <p:cNvPr id="186" name="Reflectometry"/>
           <p:cNvSpPr txBox="1"/>
           <p:nvPr>
             <p:ph type="title"/>
@@ -13109,7 +13121,7 @@
       </p:sp>
       <p:sp>
         <p:nvSpPr>
-          <p:cNvPr id="122" name="Used to probe properties of surfaces and interfaces - solids and liquids"/>
+          <p:cNvPr id="187" name="Used to probe properties of surfaces and interfaces - solids and liquids"/>
           <p:cNvSpPr txBox="1"/>
           <p:nvPr>
             <p:ph type="body" idx="1"/>
@@ -13133,7 +13145,7 @@
       </p:sp>
       <p:sp>
         <p:nvSpPr>
-          <p:cNvPr id="123" name="Slide Number"/>
+          <p:cNvPr id="188" name="Slide Number"/>
           <p:cNvSpPr txBox="1"/>
           <p:nvPr>
             <p:ph type="sldNum" sz="quarter" idx="2"/>
@@ -13160,7 +13172,7 @@
       </p:sp>
       <p:pic>
         <p:nvPicPr>
-          <p:cNvPr id="124" name="Screenshot 2021-05-05 at 22.24.00.png" descr="Screenshot 2021-05-05 at 22.24.00.png"/>
+          <p:cNvPr id="189" name="Screenshot 2021-05-05 at 22.24.00.png" descr="Screenshot 2021-05-05 at 22.24.00.png"/>
           <p:cNvPicPr>
             <a:picLocks noChangeAspect="1"/>
           </p:cNvPicPr>
@@ -13215,7 +13227,7 @@
       </p:grpSpPr>
       <p:sp>
         <p:nvSpPr>
-          <p:cNvPr id="126" name="Reflectometry samples in McStas"/>
+          <p:cNvPr id="191" name="Reflectometry samples in McStas"/>
           <p:cNvSpPr txBox="1"/>
           <p:nvPr>
             <p:ph type="title"/>
@@ -13239,7 +13251,7 @@
       </p:sp>
       <p:sp>
         <p:nvSpPr>
-          <p:cNvPr id="127" name="Double-click to edit"/>
+          <p:cNvPr id="192" name="Double-click to edit"/>
           <p:cNvSpPr txBox="1"/>
           <p:nvPr>
             <p:ph type="body" idx="1"/>
@@ -13260,7 +13272,7 @@
       </p:sp>
       <p:sp>
         <p:nvSpPr>
-          <p:cNvPr id="128" name="Slide Number"/>
+          <p:cNvPr id="193" name="Slide Number"/>
           <p:cNvSpPr txBox="1"/>
           <p:nvPr>
             <p:ph type="sldNum" sz="quarter" idx="2"/>
@@ -13287,7 +13299,7 @@
       </p:sp>
       <p:pic>
         <p:nvPicPr>
-          <p:cNvPr id="129" name="Screenshot 2021-05-05 at 21.57.00.png" descr="Screenshot 2021-05-05 at 21.57.00.png"/>
+          <p:cNvPr id="194" name="Screenshot 2021-05-05 at 21.57.00.png" descr="Screenshot 2021-05-05 at 21.57.00.png"/>
           <p:cNvPicPr>
             <a:picLocks noChangeAspect="1"/>
           </p:cNvPicPr>
@@ -13316,7 +13328,7 @@
       </p:pic>
       <p:pic>
         <p:nvPicPr>
-          <p:cNvPr id="130" name="Screenshot 2021-05-05 at 22.25.17.png" descr="Screenshot 2021-05-05 at 22.25.17.png"/>
+          <p:cNvPr id="195" name="Screenshot 2021-05-05 at 22.25.17.png" descr="Screenshot 2021-05-05 at 22.25.17.png"/>
           <p:cNvPicPr>
             <a:picLocks noChangeAspect="1"/>
           </p:cNvPicPr>
@@ -13371,7 +13383,7 @@
       </p:grpSpPr>
       <p:sp>
         <p:nvSpPr>
-          <p:cNvPr id="132" name="Example: Multilayer_sample"/>
+          <p:cNvPr id="197" name="Example: Multilayer_sample"/>
           <p:cNvSpPr txBox="1"/>
           <p:nvPr>
             <p:ph type="title"/>
@@ -13395,7 +13407,7 @@
       </p:sp>
       <p:sp>
         <p:nvSpPr>
-          <p:cNvPr id="133" name="Double-click to edit"/>
+          <p:cNvPr id="198" name="Double-click to edit"/>
           <p:cNvSpPr txBox="1"/>
           <p:nvPr>
             <p:ph type="body" idx="1"/>
@@ -13416,7 +13428,7 @@
       </p:sp>
       <p:sp>
         <p:nvSpPr>
-          <p:cNvPr id="134" name="Slide Number"/>
+          <p:cNvPr id="199" name="Slide Number"/>
           <p:cNvSpPr txBox="1"/>
           <p:nvPr>
             <p:ph type="sldNum" sz="quarter" idx="2"/>
@@ -13443,7 +13455,7 @@
       </p:sp>
       <p:pic>
         <p:nvPicPr>
-          <p:cNvPr id="135" name="Screenshot 2021-05-05 at 22.28.39.png" descr="Screenshot 2021-05-05 at 22.28.39.png"/>
+          <p:cNvPr id="200" name="Screenshot 2021-05-05 at 22.28.39.png" descr="Screenshot 2021-05-05 at 22.28.39.png"/>
           <p:cNvPicPr>
             <a:picLocks noChangeAspect="1"/>
           </p:cNvPicPr>
@@ -13498,7 +13510,7 @@
       </p:grpSpPr>
       <p:sp>
         <p:nvSpPr>
-          <p:cNvPr id="137" name="Slide Number"/>
+          <p:cNvPr id="202" name="Slide Number"/>
           <p:cNvSpPr txBox="1"/>
           <p:nvPr>
             <p:ph type="sldNum" sz="quarter" idx="2"/>
@@ -13525,7 +13537,7 @@
       </p:sp>
       <p:sp>
         <p:nvSpPr>
-          <p:cNvPr id="138" name="CustomShape 1"/>
+          <p:cNvPr id="203" name="CustomShape 1"/>
           <p:cNvSpPr txBox="1"/>
           <p:nvPr/>
         </p:nvSpPr>
@@ -13567,7 +13579,7 @@
       </p:sp>
       <p:sp>
         <p:nvSpPr>
-          <p:cNvPr id="139" name="CustomShape 2"/>
+          <p:cNvPr id="204" name="CustomShape 2"/>
           <p:cNvSpPr txBox="1"/>
           <p:nvPr/>
         </p:nvSpPr>
@@ -13617,7 +13629,7 @@
       </p:sp>
       <p:pic>
         <p:nvPicPr>
-          <p:cNvPr id="140" name="image148.png" descr="image148.png"/>
+          <p:cNvPr id="205" name="image148.png" descr="image148.png"/>
           <p:cNvPicPr>
             <a:picLocks noChangeAspect="1"/>
           </p:cNvPicPr>
@@ -13646,7 +13658,7 @@
       </p:pic>
       <p:pic>
         <p:nvPicPr>
-          <p:cNvPr id="141" name="image149.png" descr="image149.png"/>
+          <p:cNvPr id="206" name="image149.png" descr="image149.png"/>
           <p:cNvPicPr>
             <a:picLocks noChangeAspect="1"/>
           </p:cNvPicPr>
@@ -13675,7 +13687,7 @@
       </p:pic>
       <p:pic>
         <p:nvPicPr>
-          <p:cNvPr id="142" name="image150.png" descr="image150.png"/>
+          <p:cNvPr id="207" name="image150.png" descr="image150.png"/>
           <p:cNvPicPr>
             <a:picLocks noChangeAspect="1"/>
           </p:cNvPicPr>
@@ -13704,7 +13716,7 @@
       </p:pic>
       <p:sp>
         <p:nvSpPr>
-          <p:cNvPr id="143" name="Rectangle"/>
+          <p:cNvPr id="208" name="Rectangle"/>
           <p:cNvSpPr/>
           <p:nvPr/>
         </p:nvSpPr>
@@ -13735,7 +13747,7 @@
       </p:sp>
       <p:sp>
         <p:nvSpPr>
-          <p:cNvPr id="144" name="Line"/>
+          <p:cNvPr id="209" name="Line"/>
           <p:cNvSpPr/>
           <p:nvPr/>
         </p:nvSpPr>
@@ -13763,7 +13775,7 @@
       </p:sp>
       <p:sp>
         <p:nvSpPr>
-          <p:cNvPr id="145" name="Line"/>
+          <p:cNvPr id="210" name="Line"/>
           <p:cNvSpPr/>
           <p:nvPr/>
         </p:nvSpPr>
@@ -13791,7 +13803,7 @@
       </p:sp>
       <p:sp>
         <p:nvSpPr>
-          <p:cNvPr id="146" name="Line"/>
+          <p:cNvPr id="211" name="Line"/>
           <p:cNvSpPr/>
           <p:nvPr/>
         </p:nvSpPr>
@@ -13819,7 +13831,7 @@
       </p:sp>
       <p:sp>
         <p:nvSpPr>
-          <p:cNvPr id="147" name="Line"/>
+          <p:cNvPr id="212" name="Line"/>
           <p:cNvSpPr/>
           <p:nvPr/>
         </p:nvSpPr>
@@ -13847,7 +13859,7 @@
       </p:sp>
       <p:sp>
         <p:nvSpPr>
-          <p:cNvPr id="148" name="Line"/>
+          <p:cNvPr id="213" name="Line"/>
           <p:cNvSpPr/>
           <p:nvPr/>
         </p:nvSpPr>
@@ -13875,7 +13887,7 @@
       </p:sp>
       <p:sp>
         <p:nvSpPr>
-          <p:cNvPr id="149" name="Oval"/>
+          <p:cNvPr id="214" name="Oval"/>
           <p:cNvSpPr/>
           <p:nvPr/>
         </p:nvSpPr>
@@ -13906,7 +13918,7 @@
       </p:sp>
       <p:sp>
         <p:nvSpPr>
-          <p:cNvPr id="156" name="Connection Line"/>
+          <p:cNvPr id="221" name="Connection Line"/>
           <p:cNvSpPr/>
           <p:nvPr/>
         </p:nvSpPr>
@@ -13963,7 +13975,7 @@
       </p:sp>
       <p:sp>
         <p:nvSpPr>
-          <p:cNvPr id="151" name="Oval"/>
+          <p:cNvPr id="216" name="Oval"/>
           <p:cNvSpPr/>
           <p:nvPr/>
         </p:nvSpPr>
@@ -13993,7 +14005,7 @@
       </p:sp>
       <p:sp>
         <p:nvSpPr>
-          <p:cNvPr id="152" name="Oval"/>
+          <p:cNvPr id="217" name="Oval"/>
           <p:cNvSpPr/>
           <p:nvPr/>
         </p:nvSpPr>
@@ -14023,7 +14035,7 @@
       </p:sp>
       <p:sp>
         <p:nvSpPr>
-          <p:cNvPr id="153" name="Line"/>
+          <p:cNvPr id="218" name="Line"/>
           <p:cNvSpPr/>
           <p:nvPr/>
         </p:nvSpPr>
@@ -14053,7 +14065,7 @@
       </p:sp>
       <p:sp>
         <p:nvSpPr>
-          <p:cNvPr id="154" name="Line"/>
+          <p:cNvPr id="219" name="Line"/>
           <p:cNvSpPr/>
           <p:nvPr/>
         </p:nvSpPr>
@@ -14083,7 +14095,7 @@
       </p:sp>
       <p:sp>
         <p:nvSpPr>
-          <p:cNvPr id="155" name="Rectangle"/>
+          <p:cNvPr id="220" name="Rectangle"/>
           <p:cNvSpPr/>
           <p:nvPr/>
         </p:nvSpPr>
@@ -14175,30 +14187,72 @@
     <a:fmtScheme name="Blank">
       <a:fillStyleLst>
         <a:solidFill>
-          <a:srgbClr val="FFFFFF"/>
+          <a:schemeClr val="phClr"/>
         </a:solidFill>
-        <a:solidFill>
-          <a:srgbClr val="FFFFFF"/>
-        </a:solidFill>
-        <a:solidFill>
-          <a:srgbClr val="FFFFFF"/>
-        </a:solidFill>
+        <a:gradFill rotWithShape="1">
+          <a:gsLst>
+            <a:gs pos="0">
+              <a:schemeClr val="phClr">
+                <a:tint val="50000"/>
+                <a:satMod val="300000"/>
+              </a:schemeClr>
+            </a:gs>
+            <a:gs pos="35000">
+              <a:schemeClr val="phClr">
+                <a:tint val="37000"/>
+                <a:satMod val="300000"/>
+              </a:schemeClr>
+            </a:gs>
+            <a:gs pos="100000">
+              <a:schemeClr val="phClr">
+                <a:tint val="15000"/>
+                <a:satMod val="350000"/>
+              </a:schemeClr>
+            </a:gs>
+          </a:gsLst>
+          <a:lin ang="16200000" scaled="1"/>
+        </a:gradFill>
+        <a:gradFill rotWithShape="1">
+          <a:gsLst>
+            <a:gs pos="0">
+              <a:schemeClr val="phClr">
+                <a:tint val="100000"/>
+                <a:shade val="100000"/>
+                <a:satMod val="129999"/>
+              </a:schemeClr>
+            </a:gs>
+            <a:gs pos="100000">
+              <a:schemeClr val="phClr">
+                <a:tint val="50000"/>
+                <a:shade val="100000"/>
+                <a:satMod val="350000"/>
+              </a:schemeClr>
+            </a:gs>
+          </a:gsLst>
+          <a:lin ang="16200000" scaled="0"/>
+        </a:gradFill>
       </a:fillStyleLst>
       <a:lnStyleLst>
-        <a:ln>
+        <a:ln w="9525" cap="flat" cmpd="sng" algn="ctr">
           <a:solidFill>
-            <a:srgbClr val="000000"/>
+            <a:schemeClr val="phClr">
+              <a:shade val="95000"/>
+              <a:satMod val="104999"/>
+            </a:schemeClr>
           </a:solidFill>
+          <a:prstDash val="solid"/>
         </a:ln>
-        <a:ln>
+        <a:ln w="25400" cap="flat" cmpd="sng" algn="ctr">
           <a:solidFill>
-            <a:srgbClr val="000000"/>
+            <a:schemeClr val="phClr"/>
           </a:solidFill>
+          <a:prstDash val="solid"/>
         </a:ln>
-        <a:ln>
+        <a:ln w="38100" cap="flat" cmpd="sng" algn="ctr">
           <a:solidFill>
-            <a:srgbClr val="000000"/>
+            <a:schemeClr val="phClr"/>
           </a:solidFill>
+          <a:prstDash val="solid"/>
         </a:ln>
       </a:lnStyleLst>
       <a:effectStyleLst>
@@ -14220,14 +14274,53 @@
       </a:effectStyleLst>
       <a:bgFillStyleLst>
         <a:solidFill>
-          <a:srgbClr val="FFFFFF"/>
+          <a:schemeClr val="phClr"/>
         </a:solidFill>
-        <a:solidFill>
-          <a:srgbClr val="FFFFFF"/>
-        </a:solidFill>
-        <a:solidFill>
-          <a:srgbClr val="FFFFFF"/>
-        </a:solidFill>
+        <a:gradFill rotWithShape="1">
+          <a:gsLst>
+            <a:gs pos="0">
+              <a:schemeClr val="phClr">
+                <a:tint val="40000"/>
+                <a:satMod val="350000"/>
+              </a:schemeClr>
+            </a:gs>
+            <a:gs pos="40000">
+              <a:schemeClr val="phClr">
+                <a:tint val="45000"/>
+                <a:shade val="99000"/>
+                <a:satMod val="350000"/>
+              </a:schemeClr>
+            </a:gs>
+            <a:gs pos="100000">
+              <a:schemeClr val="phClr">
+                <a:shade val="20000"/>
+                <a:satMod val="255000"/>
+              </a:schemeClr>
+            </a:gs>
+          </a:gsLst>
+          <a:path path="circle">
+            <a:fillToRect l="50000" t="-80000" r="50000" b="180000"/>
+          </a:path>
+        </a:gradFill>
+        <a:gradFill rotWithShape="1">
+          <a:gsLst>
+            <a:gs pos="0">
+              <a:schemeClr val="phClr">
+                <a:tint val="80000"/>
+                <a:satMod val="300000"/>
+              </a:schemeClr>
+            </a:gs>
+            <a:gs pos="100000">
+              <a:schemeClr val="phClr">
+                <a:shade val="30000"/>
+                <a:satMod val="200000"/>
+              </a:schemeClr>
+            </a:gs>
+          </a:gsLst>
+          <a:path path="circle">
+            <a:fillToRect l="50000" t="50000" r="50000" b="50000"/>
+          </a:path>
+        </a:gradFill>
       </a:bgFillStyleLst>
     </a:fmtScheme>
   </a:themeElements>
@@ -15160,30 +15253,72 @@
     <a:fmtScheme name="Blank">
       <a:fillStyleLst>
         <a:solidFill>
-          <a:srgbClr val="FFFFFF"/>
+          <a:schemeClr val="phClr"/>
         </a:solidFill>
-        <a:solidFill>
-          <a:srgbClr val="FFFFFF"/>
-        </a:solidFill>
-        <a:solidFill>
-          <a:srgbClr val="FFFFFF"/>
-        </a:solidFill>
+        <a:gradFill rotWithShape="1">
+          <a:gsLst>
+            <a:gs pos="0">
+              <a:schemeClr val="phClr">
+                <a:tint val="50000"/>
+                <a:satMod val="300000"/>
+              </a:schemeClr>
+            </a:gs>
+            <a:gs pos="35000">
+              <a:schemeClr val="phClr">
+                <a:tint val="37000"/>
+                <a:satMod val="300000"/>
+              </a:schemeClr>
+            </a:gs>
+            <a:gs pos="100000">
+              <a:schemeClr val="phClr">
+                <a:tint val="15000"/>
+                <a:satMod val="350000"/>
+              </a:schemeClr>
+            </a:gs>
+          </a:gsLst>
+          <a:lin ang="16200000" scaled="1"/>
+        </a:gradFill>
+        <a:gradFill rotWithShape="1">
+          <a:gsLst>
+            <a:gs pos="0">
+              <a:schemeClr val="phClr">
+                <a:tint val="100000"/>
+                <a:shade val="100000"/>
+                <a:satMod val="129999"/>
+              </a:schemeClr>
+            </a:gs>
+            <a:gs pos="100000">
+              <a:schemeClr val="phClr">
+                <a:tint val="50000"/>
+                <a:shade val="100000"/>
+                <a:satMod val="350000"/>
+              </a:schemeClr>
+            </a:gs>
+          </a:gsLst>
+          <a:lin ang="16200000" scaled="0"/>
+        </a:gradFill>
       </a:fillStyleLst>
       <a:lnStyleLst>
-        <a:ln>
+        <a:ln w="9525" cap="flat" cmpd="sng" algn="ctr">
           <a:solidFill>
-            <a:srgbClr val="000000"/>
+            <a:schemeClr val="phClr">
+              <a:shade val="95000"/>
+              <a:satMod val="104999"/>
+            </a:schemeClr>
           </a:solidFill>
+          <a:prstDash val="solid"/>
         </a:ln>
-        <a:ln>
+        <a:ln w="25400" cap="flat" cmpd="sng" algn="ctr">
           <a:solidFill>
-            <a:srgbClr val="000000"/>
+            <a:schemeClr val="phClr"/>
           </a:solidFill>
+          <a:prstDash val="solid"/>
         </a:ln>
-        <a:ln>
+        <a:ln w="38100" cap="flat" cmpd="sng" algn="ctr">
           <a:solidFill>
-            <a:srgbClr val="000000"/>
+            <a:schemeClr val="phClr"/>
           </a:solidFill>
+          <a:prstDash val="solid"/>
         </a:ln>
       </a:lnStyleLst>
       <a:effectStyleLst>
@@ -15205,14 +15340,53 @@
       </a:effectStyleLst>
       <a:bgFillStyleLst>
         <a:solidFill>
-          <a:srgbClr val="FFFFFF"/>
+          <a:schemeClr val="phClr"/>
         </a:solidFill>
-        <a:solidFill>
-          <a:srgbClr val="FFFFFF"/>
-        </a:solidFill>
-        <a:solidFill>
-          <a:srgbClr val="FFFFFF"/>
-        </a:solidFill>
+        <a:gradFill rotWithShape="1">
+          <a:gsLst>
+            <a:gs pos="0">
+              <a:schemeClr val="phClr">
+                <a:tint val="40000"/>
+                <a:satMod val="350000"/>
+              </a:schemeClr>
+            </a:gs>
+            <a:gs pos="40000">
+              <a:schemeClr val="phClr">
+                <a:tint val="45000"/>
+                <a:shade val="99000"/>
+                <a:satMod val="350000"/>
+              </a:schemeClr>
+            </a:gs>
+            <a:gs pos="100000">
+              <a:schemeClr val="phClr">
+                <a:shade val="20000"/>
+                <a:satMod val="255000"/>
+              </a:schemeClr>
+            </a:gs>
+          </a:gsLst>
+          <a:path path="circle">
+            <a:fillToRect l="50000" t="-80000" r="50000" b="180000"/>
+          </a:path>
+        </a:gradFill>
+        <a:gradFill rotWithShape="1">
+          <a:gsLst>
+            <a:gs pos="0">
+              <a:schemeClr val="phClr">
+                <a:tint val="80000"/>
+                <a:satMod val="300000"/>
+              </a:schemeClr>
+            </a:gs>
+            <a:gs pos="100000">
+              <a:schemeClr val="phClr">
+                <a:shade val="30000"/>
+                <a:satMod val="200000"/>
+              </a:schemeClr>
+            </a:gs>
+          </a:gsLst>
+          <a:path path="circle">
+            <a:fillToRect l="50000" t="50000" r="50000" b="50000"/>
+          </a:path>
+        </a:gradFill>
       </a:bgFillStyleLst>
     </a:fmtScheme>
   </a:themeElements>

</xml_diff>